<commit_message>
Factory Pattern and Object Pool
Factory pattern implemented for two types of factories
Simple - Creates objects by loading a prefab
Complex - Creates objects by assembling them by components

ObjectPool
Before factory creates something, checks if exists in object pool first.
Items that can be pooled implement the interface IPoolable

Update Doc - Ppt

Cleanup - Renamed some objects to match Enum names, so it would be easy
to load them using code
</commit_message>
<xml_diff>
--- a/Docs/FlowPresentation.pptx
+++ b/Docs/FlowPresentation.pptx
@@ -137,7 +137,7 @@
   </p:defaultTextStyle>
   <p:extLst>
     <p:ext uri="{EFAFB233-063F-42B5-8137-9DF3F51BA10A}">
-      <p15:sldGuideLst xmlns:p15="http://schemas.microsoft.com/office/powerpoint/2012/main">
+      <p15:sldGuideLst xmlns:p15="http://schemas.microsoft.com/office/powerpoint/2012/main" xmlns="">
         <p15:guide id="1" orient="horz" pos="2160">
           <p15:clr>
             <a:srgbClr val="A4A3A4"/>
@@ -236,7 +236,8 @@
           <a:p>
             <a:fld id="{A1393417-AD47-4CE1-9CAA-11555EC5CC1B}" type="datetimeFigureOut">
               <a:rPr lang="en-CA" smtClean="0"/>
-              <a:t>2018-03-28</a:t>
+              <a:pPr/>
+              <a:t>28/03/2018</a:t>
             </a:fld>
             <a:endParaRPr lang="en-CA"/>
           </a:p>
@@ -395,7 +396,8 @@
           <a:p>
             <a:fld id="{B8ED4D81-00A6-4FE4-8D49-0C43A3DF05E4}" type="slidenum">
               <a:rPr lang="en-CA" smtClean="0"/>
-              <a:t>‹N°›</a:t>
+              <a:pPr/>
+              <a:t>‹#›</a:t>
             </a:fld>
             <a:endParaRPr lang="en-CA"/>
           </a:p>
@@ -404,7 +406,7 @@
     </p:spTree>
     <p:extLst>
       <p:ext uri="{BB962C8B-B14F-4D97-AF65-F5344CB8AC3E}">
-        <p14:creationId xmlns:p14="http://schemas.microsoft.com/office/powerpoint/2010/main" val="537986940"/>
+        <p14:creationId xmlns:p14="http://schemas.microsoft.com/office/powerpoint/2010/main" xmlns="" val="537986940"/>
       </p:ext>
     </p:extLst>
   </p:cSld>
@@ -569,6 +571,7 @@
           <a:p>
             <a:fld id="{B8ED4D81-00A6-4FE4-8D49-0C43A3DF05E4}" type="slidenum">
               <a:rPr lang="en-CA" smtClean="0"/>
+              <a:pPr/>
               <a:t>26</a:t>
             </a:fld>
             <a:endParaRPr lang="en-CA"/>
@@ -578,7 +581,7 @@
     </p:spTree>
     <p:extLst>
       <p:ext uri="{BB962C8B-B14F-4D97-AF65-F5344CB8AC3E}">
-        <p14:creationId xmlns:p14="http://schemas.microsoft.com/office/powerpoint/2010/main" val="1230010399"/>
+        <p14:creationId xmlns:p14="http://schemas.microsoft.com/office/powerpoint/2010/main" xmlns="" val="1230010399"/>
       </p:ext>
     </p:extLst>
   </p:cSld>
@@ -770,7 +773,7 @@
             <a:fld id="{D963E873-D05E-4F2C-8641-756E1EB81232}" type="datetimeFigureOut">
               <a:rPr lang="en-US" smtClean="0"/>
               <a:pPr/>
-              <a:t>3/28/2018</a:t>
+              <a:t>28-Mar-18</a:t>
             </a:fld>
             <a:endParaRPr lang="en-US"/>
           </a:p>
@@ -813,7 +816,7 @@
             <a:fld id="{3F690945-1A2F-4B35-BE90-FAECBB75B2E3}" type="slidenum">
               <a:rPr lang="en-US" smtClean="0"/>
               <a:pPr/>
-              <a:t>‹N°›</a:t>
+              <a:t>‹#›</a:t>
             </a:fld>
             <a:endParaRPr lang="en-US"/>
           </a:p>
@@ -937,7 +940,7 @@
             <a:fld id="{D963E873-D05E-4F2C-8641-756E1EB81232}" type="datetimeFigureOut">
               <a:rPr lang="en-US" smtClean="0"/>
               <a:pPr/>
-              <a:t>3/28/2018</a:t>
+              <a:t>28-Mar-18</a:t>
             </a:fld>
             <a:endParaRPr lang="en-US"/>
           </a:p>
@@ -980,7 +983,7 @@
             <a:fld id="{3F690945-1A2F-4B35-BE90-FAECBB75B2E3}" type="slidenum">
               <a:rPr lang="en-US" smtClean="0"/>
               <a:pPr/>
-              <a:t>‹N°›</a:t>
+              <a:t>‹#›</a:t>
             </a:fld>
             <a:endParaRPr lang="en-US"/>
           </a:p>
@@ -1114,7 +1117,7 @@
             <a:fld id="{D963E873-D05E-4F2C-8641-756E1EB81232}" type="datetimeFigureOut">
               <a:rPr lang="en-US" smtClean="0"/>
               <a:pPr/>
-              <a:t>3/28/2018</a:t>
+              <a:t>28-Mar-18</a:t>
             </a:fld>
             <a:endParaRPr lang="en-US"/>
           </a:p>
@@ -1157,7 +1160,7 @@
             <a:fld id="{3F690945-1A2F-4B35-BE90-FAECBB75B2E3}" type="slidenum">
               <a:rPr lang="en-US" smtClean="0"/>
               <a:pPr/>
-              <a:t>‹N°›</a:t>
+              <a:t>‹#›</a:t>
             </a:fld>
             <a:endParaRPr lang="en-US"/>
           </a:p>
@@ -1281,7 +1284,7 @@
             <a:fld id="{D963E873-D05E-4F2C-8641-756E1EB81232}" type="datetimeFigureOut">
               <a:rPr lang="en-US" smtClean="0"/>
               <a:pPr/>
-              <a:t>3/28/2018</a:t>
+              <a:t>28-Mar-18</a:t>
             </a:fld>
             <a:endParaRPr lang="en-US"/>
           </a:p>
@@ -1324,7 +1327,7 @@
             <a:fld id="{3F690945-1A2F-4B35-BE90-FAECBB75B2E3}" type="slidenum">
               <a:rPr lang="en-US" smtClean="0"/>
               <a:pPr/>
-              <a:t>‹N°›</a:t>
+              <a:t>‹#›</a:t>
             </a:fld>
             <a:endParaRPr lang="en-US"/>
           </a:p>
@@ -1524,7 +1527,7 @@
             <a:fld id="{D963E873-D05E-4F2C-8641-756E1EB81232}" type="datetimeFigureOut">
               <a:rPr lang="en-US" smtClean="0"/>
               <a:pPr/>
-              <a:t>3/28/2018</a:t>
+              <a:t>28-Mar-18</a:t>
             </a:fld>
             <a:endParaRPr lang="en-US"/>
           </a:p>
@@ -1567,7 +1570,7 @@
             <a:fld id="{3F690945-1A2F-4B35-BE90-FAECBB75B2E3}" type="slidenum">
               <a:rPr lang="en-US" smtClean="0"/>
               <a:pPr/>
-              <a:t>‹N°›</a:t>
+              <a:t>‹#›</a:t>
             </a:fld>
             <a:endParaRPr lang="en-US"/>
           </a:p>
@@ -1809,7 +1812,7 @@
             <a:fld id="{D963E873-D05E-4F2C-8641-756E1EB81232}" type="datetimeFigureOut">
               <a:rPr lang="en-US" smtClean="0"/>
               <a:pPr/>
-              <a:t>3/28/2018</a:t>
+              <a:t>28-Mar-18</a:t>
             </a:fld>
             <a:endParaRPr lang="en-US"/>
           </a:p>
@@ -1852,7 +1855,7 @@
             <a:fld id="{3F690945-1A2F-4B35-BE90-FAECBB75B2E3}" type="slidenum">
               <a:rPr lang="en-US" smtClean="0"/>
               <a:pPr/>
-              <a:t>‹N°›</a:t>
+              <a:t>‹#›</a:t>
             </a:fld>
             <a:endParaRPr lang="en-US"/>
           </a:p>
@@ -2228,7 +2231,7 @@
             <a:fld id="{D963E873-D05E-4F2C-8641-756E1EB81232}" type="datetimeFigureOut">
               <a:rPr lang="en-US" smtClean="0"/>
               <a:pPr/>
-              <a:t>3/28/2018</a:t>
+              <a:t>28-Mar-18</a:t>
             </a:fld>
             <a:endParaRPr lang="en-US"/>
           </a:p>
@@ -2271,7 +2274,7 @@
             <a:fld id="{3F690945-1A2F-4B35-BE90-FAECBB75B2E3}" type="slidenum">
               <a:rPr lang="en-US" smtClean="0"/>
               <a:pPr/>
-              <a:t>‹N°›</a:t>
+              <a:t>‹#›</a:t>
             </a:fld>
             <a:endParaRPr lang="en-US"/>
           </a:p>
@@ -2343,7 +2346,7 @@
             <a:fld id="{D963E873-D05E-4F2C-8641-756E1EB81232}" type="datetimeFigureOut">
               <a:rPr lang="en-US" smtClean="0"/>
               <a:pPr/>
-              <a:t>3/28/2018</a:t>
+              <a:t>28-Mar-18</a:t>
             </a:fld>
             <a:endParaRPr lang="en-US"/>
           </a:p>
@@ -2386,7 +2389,7 @@
             <a:fld id="{3F690945-1A2F-4B35-BE90-FAECBB75B2E3}" type="slidenum">
               <a:rPr lang="en-US" smtClean="0"/>
               <a:pPr/>
-              <a:t>‹N°›</a:t>
+              <a:t>‹#›</a:t>
             </a:fld>
             <a:endParaRPr lang="en-US"/>
           </a:p>
@@ -2435,7 +2438,7 @@
             <a:fld id="{D963E873-D05E-4F2C-8641-756E1EB81232}" type="datetimeFigureOut">
               <a:rPr lang="en-US" smtClean="0"/>
               <a:pPr/>
-              <a:t>3/28/2018</a:t>
+              <a:t>28-Mar-18</a:t>
             </a:fld>
             <a:endParaRPr lang="en-US"/>
           </a:p>
@@ -2478,7 +2481,7 @@
             <a:fld id="{3F690945-1A2F-4B35-BE90-FAECBB75B2E3}" type="slidenum">
               <a:rPr lang="en-US" smtClean="0"/>
               <a:pPr/>
-              <a:t>‹N°›</a:t>
+              <a:t>‹#›</a:t>
             </a:fld>
             <a:endParaRPr lang="en-US"/>
           </a:p>
@@ -2709,7 +2712,7 @@
             <a:fld id="{D963E873-D05E-4F2C-8641-756E1EB81232}" type="datetimeFigureOut">
               <a:rPr lang="en-US" smtClean="0"/>
               <a:pPr/>
-              <a:t>3/28/2018</a:t>
+              <a:t>28-Mar-18</a:t>
             </a:fld>
             <a:endParaRPr lang="en-US"/>
           </a:p>
@@ -2752,7 +2755,7 @@
             <a:fld id="{3F690945-1A2F-4B35-BE90-FAECBB75B2E3}" type="slidenum">
               <a:rPr lang="en-US" smtClean="0"/>
               <a:pPr/>
-              <a:t>‹N°›</a:t>
+              <a:t>‹#›</a:t>
             </a:fld>
             <a:endParaRPr lang="en-US"/>
           </a:p>
@@ -2959,7 +2962,7 @@
             <a:fld id="{D963E873-D05E-4F2C-8641-756E1EB81232}" type="datetimeFigureOut">
               <a:rPr lang="en-US" smtClean="0"/>
               <a:pPr/>
-              <a:t>3/28/2018</a:t>
+              <a:t>28-Mar-18</a:t>
             </a:fld>
             <a:endParaRPr lang="en-US"/>
           </a:p>
@@ -3002,7 +3005,7 @@
             <a:fld id="{3F690945-1A2F-4B35-BE90-FAECBB75B2E3}" type="slidenum">
               <a:rPr lang="en-US" smtClean="0"/>
               <a:pPr/>
-              <a:t>‹N°›</a:t>
+              <a:t>‹#›</a:t>
             </a:fld>
             <a:endParaRPr lang="en-US"/>
           </a:p>
@@ -3169,7 +3172,7 @@
             <a:fld id="{D963E873-D05E-4F2C-8641-756E1EB81232}" type="datetimeFigureOut">
               <a:rPr lang="en-US" smtClean="0"/>
               <a:pPr/>
-              <a:t>3/28/2018</a:t>
+              <a:t>28-Mar-18</a:t>
             </a:fld>
             <a:endParaRPr lang="en-US"/>
           </a:p>
@@ -3248,7 +3251,7 @@
             <a:fld id="{3F690945-1A2F-4B35-BE90-FAECBB75B2E3}" type="slidenum">
               <a:rPr lang="en-US" smtClean="0"/>
               <a:pPr/>
-              <a:t>‹N°›</a:t>
+              <a:t>‹#›</a:t>
             </a:fld>
             <a:endParaRPr lang="en-US"/>
           </a:p>
@@ -4879,7 +4882,7 @@
     </p:spTree>
     <p:extLst>
       <p:ext uri="{BB962C8B-B14F-4D97-AF65-F5344CB8AC3E}">
-        <p14:creationId xmlns:p14="http://schemas.microsoft.com/office/powerpoint/2010/main" val="1870198522"/>
+        <p14:creationId xmlns:p14="http://schemas.microsoft.com/office/powerpoint/2010/main" xmlns="" val="1870198522"/>
       </p:ext>
     </p:extLst>
   </p:cSld>
@@ -5010,7 +5013,7 @@
     </p:spTree>
     <p:extLst>
       <p:ext uri="{BB962C8B-B14F-4D97-AF65-F5344CB8AC3E}">
-        <p14:creationId xmlns:p14="http://schemas.microsoft.com/office/powerpoint/2010/main" val="1548395017"/>
+        <p14:creationId xmlns:p14="http://schemas.microsoft.com/office/powerpoint/2010/main" xmlns="" val="1548395017"/>
       </p:ext>
     </p:extLst>
   </p:cSld>
@@ -5191,7 +5194,7 @@
     </p:spTree>
     <p:extLst>
       <p:ext uri="{BB962C8B-B14F-4D97-AF65-F5344CB8AC3E}">
-        <p14:creationId xmlns:p14="http://schemas.microsoft.com/office/powerpoint/2010/main" val="3655487511"/>
+        <p14:creationId xmlns:p14="http://schemas.microsoft.com/office/powerpoint/2010/main" xmlns="" val="3655487511"/>
       </p:ext>
     </p:extLst>
   </p:cSld>
@@ -5295,7 +5298,7 @@
     </p:spTree>
     <p:extLst>
       <p:ext uri="{BB962C8B-B14F-4D97-AF65-F5344CB8AC3E}">
-        <p14:creationId xmlns:p14="http://schemas.microsoft.com/office/powerpoint/2010/main" val="3247580462"/>
+        <p14:creationId xmlns:p14="http://schemas.microsoft.com/office/powerpoint/2010/main" xmlns="" val="3247580462"/>
       </p:ext>
     </p:extLst>
   </p:cSld>
@@ -5391,7 +5394,7 @@
     </p:spTree>
     <p:extLst>
       <p:ext uri="{BB962C8B-B14F-4D97-AF65-F5344CB8AC3E}">
-        <p14:creationId xmlns:p14="http://schemas.microsoft.com/office/powerpoint/2010/main" val="89659571"/>
+        <p14:creationId xmlns:p14="http://schemas.microsoft.com/office/powerpoint/2010/main" xmlns="" val="89659571"/>
       </p:ext>
     </p:extLst>
   </p:cSld>
@@ -5522,7 +5525,7 @@
     </p:spTree>
     <p:extLst>
       <p:ext uri="{BB962C8B-B14F-4D97-AF65-F5344CB8AC3E}">
-        <p14:creationId xmlns:p14="http://schemas.microsoft.com/office/powerpoint/2010/main" val="3304679340"/>
+        <p14:creationId xmlns:p14="http://schemas.microsoft.com/office/powerpoint/2010/main" xmlns="" val="3304679340"/>
       </p:ext>
     </p:extLst>
   </p:cSld>
@@ -5724,7 +5727,7 @@
     </p:spTree>
     <p:extLst>
       <p:ext uri="{BB962C8B-B14F-4D97-AF65-F5344CB8AC3E}">
-        <p14:creationId xmlns:p14="http://schemas.microsoft.com/office/powerpoint/2010/main" val="238003343"/>
+        <p14:creationId xmlns:p14="http://schemas.microsoft.com/office/powerpoint/2010/main" xmlns="" val="238003343"/>
       </p:ext>
     </p:extLst>
   </p:cSld>
@@ -5899,7 +5902,7 @@
     </p:spTree>
     <p:extLst>
       <p:ext uri="{BB962C8B-B14F-4D97-AF65-F5344CB8AC3E}">
-        <p14:creationId xmlns:p14="http://schemas.microsoft.com/office/powerpoint/2010/main" val="1164581419"/>
+        <p14:creationId xmlns:p14="http://schemas.microsoft.com/office/powerpoint/2010/main" xmlns="" val="1164581419"/>
       </p:ext>
     </p:extLst>
   </p:cSld>
@@ -6389,7 +6392,7 @@
     </p:spTree>
     <p:extLst>
       <p:ext uri="{BB962C8B-B14F-4D97-AF65-F5344CB8AC3E}">
-        <p14:creationId xmlns:p14="http://schemas.microsoft.com/office/powerpoint/2010/main" val="576234893"/>
+        <p14:creationId xmlns:p14="http://schemas.microsoft.com/office/powerpoint/2010/main" xmlns="" val="576234893"/>
       </p:ext>
     </p:extLst>
   </p:cSld>
@@ -6570,7 +6573,7 @@
     </p:spTree>
     <p:extLst>
       <p:ext uri="{BB962C8B-B14F-4D97-AF65-F5344CB8AC3E}">
-        <p14:creationId xmlns:p14="http://schemas.microsoft.com/office/powerpoint/2010/main" val="3814057654"/>
+        <p14:creationId xmlns:p14="http://schemas.microsoft.com/office/powerpoint/2010/main" xmlns="" val="3814057654"/>
       </p:ext>
     </p:extLst>
   </p:cSld>
@@ -6818,7 +6821,7 @@
     </p:spTree>
     <p:extLst>
       <p:ext uri="{BB962C8B-B14F-4D97-AF65-F5344CB8AC3E}">
-        <p14:creationId xmlns:p14="http://schemas.microsoft.com/office/powerpoint/2010/main" val="2202625718"/>
+        <p14:creationId xmlns:p14="http://schemas.microsoft.com/office/powerpoint/2010/main" xmlns="" val="2202625718"/>
       </p:ext>
     </p:extLst>
   </p:cSld>
@@ -7043,7 +7046,7 @@
     </p:spTree>
     <p:extLst>
       <p:ext uri="{BB962C8B-B14F-4D97-AF65-F5344CB8AC3E}">
-        <p14:creationId xmlns:p14="http://schemas.microsoft.com/office/powerpoint/2010/main" val="1176327043"/>
+        <p14:creationId xmlns:p14="http://schemas.microsoft.com/office/powerpoint/2010/main" xmlns="" val="1176327043"/>
       </p:ext>
     </p:extLst>
   </p:cSld>
@@ -7156,7 +7159,7 @@
     </p:spTree>
     <p:extLst>
       <p:ext uri="{BB962C8B-B14F-4D97-AF65-F5344CB8AC3E}">
-        <p14:creationId xmlns:p14="http://schemas.microsoft.com/office/powerpoint/2010/main" val="1493326531"/>
+        <p14:creationId xmlns:p14="http://schemas.microsoft.com/office/powerpoint/2010/main" xmlns="" val="1493326531"/>
       </p:ext>
     </p:extLst>
   </p:cSld>
@@ -7311,7 +7314,7 @@
           <p:nvPr/>
         </p:nvPicPr>
         <p:blipFill>
-          <a:blip r:embed="rId2"/>
+          <a:blip r:embed="rId2" cstate="print"/>
           <a:stretch>
             <a:fillRect/>
           </a:stretch>
@@ -7329,7 +7332,7 @@
     </p:spTree>
     <p:extLst>
       <p:ext uri="{BB962C8B-B14F-4D97-AF65-F5344CB8AC3E}">
-        <p14:creationId xmlns:p14="http://schemas.microsoft.com/office/powerpoint/2010/main" val="3269125113"/>
+        <p14:creationId xmlns:p14="http://schemas.microsoft.com/office/powerpoint/2010/main" xmlns="" val="3269125113"/>
       </p:ext>
     </p:extLst>
   </p:cSld>
@@ -7479,7 +7482,7 @@
           <p:nvPr/>
         </p:nvPicPr>
         <p:blipFill>
-          <a:blip r:embed="rId3"/>
+          <a:blip r:embed="rId3" cstate="print"/>
           <a:stretch>
             <a:fillRect/>
           </a:stretch>
@@ -7497,7 +7500,7 @@
     </p:spTree>
     <p:extLst>
       <p:ext uri="{BB962C8B-B14F-4D97-AF65-F5344CB8AC3E}">
-        <p14:creationId xmlns:p14="http://schemas.microsoft.com/office/powerpoint/2010/main" val="3303479339"/>
+        <p14:creationId xmlns:p14="http://schemas.microsoft.com/office/powerpoint/2010/main" xmlns="" val="3303479339"/>
       </p:ext>
     </p:extLst>
   </p:cSld>
@@ -7690,7 +7693,7 @@
     </p:spTree>
     <p:extLst>
       <p:ext uri="{BB962C8B-B14F-4D97-AF65-F5344CB8AC3E}">
-        <p14:creationId xmlns:p14="http://schemas.microsoft.com/office/powerpoint/2010/main" val="3537970018"/>
+        <p14:creationId xmlns:p14="http://schemas.microsoft.com/office/powerpoint/2010/main" xmlns="" val="3537970018"/>
       </p:ext>
     </p:extLst>
   </p:cSld>
@@ -8003,7 +8006,7 @@
     </p:spTree>
     <p:extLst>
       <p:ext uri="{BB962C8B-B14F-4D97-AF65-F5344CB8AC3E}">
-        <p14:creationId xmlns:p14="http://schemas.microsoft.com/office/powerpoint/2010/main" val="2082311432"/>
+        <p14:creationId xmlns:p14="http://schemas.microsoft.com/office/powerpoint/2010/main" xmlns="" val="2082311432"/>
       </p:ext>
     </p:extLst>
   </p:cSld>
@@ -8316,7 +8319,7 @@
     </p:spTree>
     <p:extLst>
       <p:ext uri="{BB962C8B-B14F-4D97-AF65-F5344CB8AC3E}">
-        <p14:creationId xmlns:p14="http://schemas.microsoft.com/office/powerpoint/2010/main" val="4168410330"/>
+        <p14:creationId xmlns:p14="http://schemas.microsoft.com/office/powerpoint/2010/main" xmlns="" val="4168410330"/>
       </p:ext>
     </p:extLst>
   </p:cSld>
@@ -10286,7 +10289,7 @@
     </a:clrScheme>
     <a:fontScheme name="Office">
       <a:majorFont>
-        <a:latin typeface="Calibri Light" panose="020F0302020204030204"/>
+        <a:latin typeface="Calibri Light"/>
         <a:ea typeface=""/>
         <a:cs typeface=""/>
         <a:font script="Jpan" typeface="ＭＳ Ｐゴシック"/>
@@ -10321,7 +10324,7 @@
         <a:font script="Geor" typeface="Sylfaen"/>
       </a:majorFont>
       <a:minorFont>
-        <a:latin typeface="Calibri" panose="020F0502020204030204"/>
+        <a:latin typeface="Calibri"/>
         <a:ea typeface=""/>
         <a:cs typeface=""/>
         <a:font script="Jpan" typeface="ＭＳ Ｐゴシック"/>
@@ -10498,7 +10501,7 @@
   <a:extraClrSchemeLst/>
   <a:extLst>
     <a:ext uri="{05A4C25C-085E-4340-85A3-A5531E510DB2}">
-      <thm15:themeFamily xmlns:thm15="http://schemas.microsoft.com/office/thememl/2012/main" name="Office Theme" id="{62F939B6-93AF-4DB8-9C6B-D6C7DFDC589F}" vid="{4A3C46E8-61CC-4603-A589-7422A47A8E4A}"/>
+      <thm15:themeFamily xmlns:thm15="http://schemas.microsoft.com/office/thememl/2012/main" xmlns="" name="Office Theme" id="{62F939B6-93AF-4DB8-9C6B-D6C7DFDC589F}" vid="{4A3C46E8-61CC-4603-A589-7422A47A8E4A}"/>
     </a:ext>
   </a:extLst>
 </a:theme>

</xml_diff>